<commit_message>
Updating, fixing a few typos.
</commit_message>
<xml_diff>
--- a/OUCC2015-Service_Oriented_Enterprise.pptx
+++ b/OUCC2015-Service_Oriented_Enterprise.pptx
@@ -353,7 +353,7 @@
             </a:pPr>
             <a:r>
               <a:rPr sz="6000"/>
-              <a:t>Click to edit Master title style</a:t>
+              <a:t>Title Text</a:t>
             </a:r>
           </a:p>
         </p:txBody>
@@ -384,6 +384,30 @@
               <a:buNone/>
               <a:defRPr sz="2400"/>
             </a:lvl1pPr>
+            <a:lvl2pPr marL="0" indent="457189" algn="ctr">
+              <a:buSzTx/>
+              <a:buFontTx/>
+              <a:buNone/>
+              <a:defRPr sz="2400"/>
+            </a:lvl2pPr>
+            <a:lvl3pPr marL="0" indent="914377" algn="ctr">
+              <a:buSzTx/>
+              <a:buFontTx/>
+              <a:buNone/>
+              <a:defRPr sz="2400"/>
+            </a:lvl3pPr>
+            <a:lvl4pPr marL="0" indent="1371565" algn="ctr">
+              <a:buSzTx/>
+              <a:buFontTx/>
+              <a:buNone/>
+              <a:defRPr sz="2400"/>
+            </a:lvl4pPr>
+            <a:lvl5pPr marL="0" indent="1828754" algn="ctr">
+              <a:buSzTx/>
+              <a:buFontTx/>
+              <a:buNone/>
+              <a:defRPr sz="2400"/>
+            </a:lvl5pPr>
           </a:lstStyle>
           <a:p>
             <a:pPr lvl="0">
@@ -391,7 +415,47 @@
             </a:pPr>
             <a:r>
               <a:rPr sz="2400"/>
-              <a:t>Click to edit Master subtitle style</a:t>
+              <a:t>Body Level One</a:t>
+            </a:r>
+            <a:endParaRPr sz="2400"/>
+          </a:p>
+          <a:p>
+            <a:pPr lvl="1">
+              <a:defRPr sz="1800"/>
+            </a:pPr>
+            <a:r>
+              <a:rPr sz="2400"/>
+              <a:t>Body Level Two</a:t>
+            </a:r>
+            <a:endParaRPr sz="2400"/>
+          </a:p>
+          <a:p>
+            <a:pPr lvl="2">
+              <a:defRPr sz="1800"/>
+            </a:pPr>
+            <a:r>
+              <a:rPr sz="2400"/>
+              <a:t>Body Level Three</a:t>
+            </a:r>
+            <a:endParaRPr sz="2400"/>
+          </a:p>
+          <a:p>
+            <a:pPr lvl="3">
+              <a:defRPr sz="1800"/>
+            </a:pPr>
+            <a:r>
+              <a:rPr sz="2400"/>
+              <a:t>Body Level Four</a:t>
+            </a:r>
+            <a:endParaRPr sz="2400"/>
+          </a:p>
+          <a:p>
+            <a:pPr lvl="4">
+              <a:defRPr sz="1800"/>
+            </a:pPr>
+            <a:r>
+              <a:rPr sz="2400"/>
+              <a:t>Body Level Five</a:t>
             </a:r>
           </a:p>
         </p:txBody>
@@ -466,7 +530,7 @@
             </a:pPr>
             <a:r>
               <a:rPr sz="4400"/>
-              <a:t>Click to edit Master title style</a:t>
+              <a:t>Title Text</a:t>
             </a:r>
           </a:p>
         </p:txBody>
@@ -493,7 +557,7 @@
             </a:pPr>
             <a:r>
               <a:rPr sz="2800"/>
-              <a:t>Click to edit Master text styles</a:t>
+              <a:t>Body Level One</a:t>
             </a:r>
             <a:endParaRPr sz="2800"/>
           </a:p>
@@ -503,7 +567,7 @@
             </a:pPr>
             <a:r>
               <a:rPr sz="2800"/>
-              <a:t>Second level</a:t>
+              <a:t>Body Level Two</a:t>
             </a:r>
             <a:endParaRPr sz="2800"/>
           </a:p>
@@ -513,7 +577,7 @@
             </a:pPr>
             <a:r>
               <a:rPr sz="2800"/>
-              <a:t>Third level</a:t>
+              <a:t>Body Level Three</a:t>
             </a:r>
             <a:endParaRPr sz="2800"/>
           </a:p>
@@ -523,7 +587,7 @@
             </a:pPr>
             <a:r>
               <a:rPr sz="2800"/>
-              <a:t>Fourth level</a:t>
+              <a:t>Body Level Four</a:t>
             </a:r>
             <a:endParaRPr sz="2800"/>
           </a:p>
@@ -533,7 +597,7 @@
             </a:pPr>
             <a:r>
               <a:rPr sz="2800"/>
-              <a:t>Fifth level</a:t>
+              <a:t>Body Level Five</a:t>
             </a:r>
           </a:p>
         </p:txBody>
@@ -612,7 +676,7 @@
             </a:pPr>
             <a:r>
               <a:rPr sz="4400"/>
-              <a:t>Click to edit Master title style</a:t>
+              <a:t>Title Text</a:t>
             </a:r>
           </a:p>
         </p:txBody>
@@ -643,7 +707,7 @@
             </a:pPr>
             <a:r>
               <a:rPr sz="2800"/>
-              <a:t>Click to edit Master text styles</a:t>
+              <a:t>Body Level One</a:t>
             </a:r>
             <a:endParaRPr sz="2800"/>
           </a:p>
@@ -653,7 +717,7 @@
             </a:pPr>
             <a:r>
               <a:rPr sz="2800"/>
-              <a:t>Second level</a:t>
+              <a:t>Body Level Two</a:t>
             </a:r>
             <a:endParaRPr sz="2800"/>
           </a:p>
@@ -663,7 +727,7 @@
             </a:pPr>
             <a:r>
               <a:rPr sz="2800"/>
-              <a:t>Third level</a:t>
+              <a:t>Body Level Three</a:t>
             </a:r>
             <a:endParaRPr sz="2800"/>
           </a:p>
@@ -673,7 +737,7 @@
             </a:pPr>
             <a:r>
               <a:rPr sz="2800"/>
-              <a:t>Fourth level</a:t>
+              <a:t>Body Level Four</a:t>
             </a:r>
             <a:endParaRPr sz="2800"/>
           </a:p>
@@ -683,7 +747,7 @@
             </a:pPr>
             <a:r>
               <a:rPr sz="2800"/>
-              <a:t>Fifth level</a:t>
+              <a:t>Body Level Five</a:t>
             </a:r>
           </a:p>
         </p:txBody>
@@ -758,7 +822,7 @@
             </a:pPr>
             <a:r>
               <a:rPr sz="4400"/>
-              <a:t>Click to edit Master title style</a:t>
+              <a:t>Title Text</a:t>
             </a:r>
           </a:p>
         </p:txBody>
@@ -785,7 +849,7 @@
             </a:pPr>
             <a:r>
               <a:rPr sz="2800"/>
-              <a:t>Click to edit Master text styles</a:t>
+              <a:t>Body Level One</a:t>
             </a:r>
             <a:endParaRPr sz="2800"/>
           </a:p>
@@ -795,7 +859,7 @@
             </a:pPr>
             <a:r>
               <a:rPr sz="2800"/>
-              <a:t>Second level</a:t>
+              <a:t>Body Level Two</a:t>
             </a:r>
             <a:endParaRPr sz="2800"/>
           </a:p>
@@ -805,7 +869,7 @@
             </a:pPr>
             <a:r>
               <a:rPr sz="2800"/>
-              <a:t>Third level</a:t>
+              <a:t>Body Level Three</a:t>
             </a:r>
             <a:endParaRPr sz="2800"/>
           </a:p>
@@ -815,7 +879,7 @@
             </a:pPr>
             <a:r>
               <a:rPr sz="2800"/>
-              <a:t>Fourth level</a:t>
+              <a:t>Body Level Four</a:t>
             </a:r>
             <a:endParaRPr sz="2800"/>
           </a:p>
@@ -825,7 +889,7 @@
             </a:pPr>
             <a:r>
               <a:rPr sz="2800"/>
-              <a:t>Fifth level</a:t>
+              <a:t>Body Level Five</a:t>
             </a:r>
           </a:p>
         </p:txBody>
@@ -908,7 +972,7 @@
             </a:pPr>
             <a:r>
               <a:rPr sz="6000"/>
-              <a:t>Click to edit Master title style</a:t>
+              <a:t>Title Text</a:t>
             </a:r>
           </a:p>
         </p:txBody>
@@ -943,6 +1007,46 @@
                 </a:solidFill>
               </a:defRPr>
             </a:lvl1pPr>
+            <a:lvl2pPr marL="0" indent="457189">
+              <a:buSzTx/>
+              <a:buFontTx/>
+              <a:buNone/>
+              <a:defRPr sz="2400">
+                <a:solidFill>
+                  <a:srgbClr val="888888"/>
+                </a:solidFill>
+              </a:defRPr>
+            </a:lvl2pPr>
+            <a:lvl3pPr marL="0" indent="914377">
+              <a:buSzTx/>
+              <a:buFontTx/>
+              <a:buNone/>
+              <a:defRPr sz="2400">
+                <a:solidFill>
+                  <a:srgbClr val="888888"/>
+                </a:solidFill>
+              </a:defRPr>
+            </a:lvl3pPr>
+            <a:lvl4pPr marL="0" indent="1371565">
+              <a:buSzTx/>
+              <a:buFontTx/>
+              <a:buNone/>
+              <a:defRPr sz="2400">
+                <a:solidFill>
+                  <a:srgbClr val="888888"/>
+                </a:solidFill>
+              </a:defRPr>
+            </a:lvl4pPr>
+            <a:lvl5pPr marL="0" indent="1828754">
+              <a:buSzTx/>
+              <a:buFontTx/>
+              <a:buNone/>
+              <a:defRPr sz="2400">
+                <a:solidFill>
+                  <a:srgbClr val="888888"/>
+                </a:solidFill>
+              </a:defRPr>
+            </a:lvl5pPr>
           </a:lstStyle>
           <a:p>
             <a:pPr lvl="0">
@@ -958,7 +1062,95 @@
                   <a:srgbClr val="888888"/>
                 </a:solidFill>
               </a:rPr>
-              <a:t>Click to edit Master text styles</a:t>
+              <a:t>Body Level One</a:t>
+            </a:r>
+            <a:endParaRPr sz="2400">
+              <a:solidFill>
+                <a:srgbClr val="888888"/>
+              </a:solidFill>
+            </a:endParaRPr>
+          </a:p>
+          <a:p>
+            <a:pPr lvl="1">
+              <a:defRPr sz="1800">
+                <a:solidFill>
+                  <a:srgbClr val="000000"/>
+                </a:solidFill>
+              </a:defRPr>
+            </a:pPr>
+            <a:r>
+              <a:rPr sz="2400">
+                <a:solidFill>
+                  <a:srgbClr val="888888"/>
+                </a:solidFill>
+              </a:rPr>
+              <a:t>Body Level Two</a:t>
+            </a:r>
+            <a:endParaRPr sz="2400">
+              <a:solidFill>
+                <a:srgbClr val="888888"/>
+              </a:solidFill>
+            </a:endParaRPr>
+          </a:p>
+          <a:p>
+            <a:pPr lvl="2">
+              <a:defRPr sz="1800">
+                <a:solidFill>
+                  <a:srgbClr val="000000"/>
+                </a:solidFill>
+              </a:defRPr>
+            </a:pPr>
+            <a:r>
+              <a:rPr sz="2400">
+                <a:solidFill>
+                  <a:srgbClr val="888888"/>
+                </a:solidFill>
+              </a:rPr>
+              <a:t>Body Level Three</a:t>
+            </a:r>
+            <a:endParaRPr sz="2400">
+              <a:solidFill>
+                <a:srgbClr val="888888"/>
+              </a:solidFill>
+            </a:endParaRPr>
+          </a:p>
+          <a:p>
+            <a:pPr lvl="3">
+              <a:defRPr sz="1800">
+                <a:solidFill>
+                  <a:srgbClr val="000000"/>
+                </a:solidFill>
+              </a:defRPr>
+            </a:pPr>
+            <a:r>
+              <a:rPr sz="2400">
+                <a:solidFill>
+                  <a:srgbClr val="888888"/>
+                </a:solidFill>
+              </a:rPr>
+              <a:t>Body Level Four</a:t>
+            </a:r>
+            <a:endParaRPr sz="2400">
+              <a:solidFill>
+                <a:srgbClr val="888888"/>
+              </a:solidFill>
+            </a:endParaRPr>
+          </a:p>
+          <a:p>
+            <a:pPr lvl="4">
+              <a:defRPr sz="1800">
+                <a:solidFill>
+                  <a:srgbClr val="000000"/>
+                </a:solidFill>
+              </a:defRPr>
+            </a:pPr>
+            <a:r>
+              <a:rPr sz="2400">
+                <a:solidFill>
+                  <a:srgbClr val="888888"/>
+                </a:solidFill>
+              </a:rPr>
+              <a:t>Body Level Five</a:t>
             </a:r>
           </a:p>
         </p:txBody>
@@ -1033,7 +1225,7 @@
             </a:pPr>
             <a:r>
               <a:rPr sz="4400"/>
-              <a:t>Click to edit Master title style</a:t>
+              <a:t>Title Text</a:t>
             </a:r>
           </a:p>
         </p:txBody>
@@ -1064,7 +1256,7 @@
             </a:pPr>
             <a:r>
               <a:rPr sz="2800"/>
-              <a:t>Click to edit Master text styles</a:t>
+              <a:t>Body Level One</a:t>
             </a:r>
             <a:endParaRPr sz="2800"/>
           </a:p>
@@ -1074,7 +1266,7 @@
             </a:pPr>
             <a:r>
               <a:rPr sz="2800"/>
-              <a:t>Second level</a:t>
+              <a:t>Body Level Two</a:t>
             </a:r>
             <a:endParaRPr sz="2800"/>
           </a:p>
@@ -1084,7 +1276,7 @@
             </a:pPr>
             <a:r>
               <a:rPr sz="2800"/>
-              <a:t>Third level</a:t>
+              <a:t>Body Level Three</a:t>
             </a:r>
             <a:endParaRPr sz="2800"/>
           </a:p>
@@ -1094,7 +1286,7 @@
             </a:pPr>
             <a:r>
               <a:rPr sz="2800"/>
-              <a:t>Fourth level</a:t>
+              <a:t>Body Level Four</a:t>
             </a:r>
             <a:endParaRPr sz="2800"/>
           </a:p>
@@ -1104,7 +1296,7 @@
             </a:pPr>
             <a:r>
               <a:rPr sz="2800"/>
-              <a:t>Fifth level</a:t>
+              <a:t>Body Level Five</a:t>
             </a:r>
           </a:p>
         </p:txBody>
@@ -1183,7 +1375,7 @@
             </a:pPr>
             <a:r>
               <a:rPr sz="4400"/>
-              <a:t>Click to edit Master title style</a:t>
+              <a:t>Title Text</a:t>
             </a:r>
           </a:p>
         </p:txBody>
@@ -1214,6 +1406,30 @@
               <a:buNone/>
               <a:defRPr b="1" sz="2400"/>
             </a:lvl1pPr>
+            <a:lvl2pPr marL="0" indent="457189">
+              <a:buSzTx/>
+              <a:buFontTx/>
+              <a:buNone/>
+              <a:defRPr b="1" sz="2400"/>
+            </a:lvl2pPr>
+            <a:lvl3pPr marL="0" indent="914377">
+              <a:buSzTx/>
+              <a:buFontTx/>
+              <a:buNone/>
+              <a:defRPr b="1" sz="2400"/>
+            </a:lvl3pPr>
+            <a:lvl4pPr marL="0" indent="1371565">
+              <a:buSzTx/>
+              <a:buFontTx/>
+              <a:buNone/>
+              <a:defRPr b="1" sz="2400"/>
+            </a:lvl4pPr>
+            <a:lvl5pPr marL="0" indent="1828754">
+              <a:buSzTx/>
+              <a:buFontTx/>
+              <a:buNone/>
+              <a:defRPr b="1" sz="2400"/>
+            </a:lvl5pPr>
           </a:lstStyle>
           <a:p>
             <a:pPr lvl="0">
@@ -1221,7 +1437,47 @@
             </a:pPr>
             <a:r>
               <a:rPr b="1" sz="2400"/>
-              <a:t>Click to edit Master text styles</a:t>
+              <a:t>Body Level One</a:t>
+            </a:r>
+            <a:endParaRPr b="1" sz="2400"/>
+          </a:p>
+          <a:p>
+            <a:pPr lvl="1">
+              <a:defRPr b="0" sz="1800"/>
+            </a:pPr>
+            <a:r>
+              <a:rPr b="1" sz="2400"/>
+              <a:t>Body Level Two</a:t>
+            </a:r>
+            <a:endParaRPr b="1" sz="2400"/>
+          </a:p>
+          <a:p>
+            <a:pPr lvl="2">
+              <a:defRPr b="0" sz="1800"/>
+            </a:pPr>
+            <a:r>
+              <a:rPr b="1" sz="2400"/>
+              <a:t>Body Level Three</a:t>
+            </a:r>
+            <a:endParaRPr b="1" sz="2400"/>
+          </a:p>
+          <a:p>
+            <a:pPr lvl="3">
+              <a:defRPr b="0" sz="1800"/>
+            </a:pPr>
+            <a:r>
+              <a:rPr b="1" sz="2400"/>
+              <a:t>Body Level Four</a:t>
+            </a:r>
+            <a:endParaRPr b="1" sz="2400"/>
+          </a:p>
+          <a:p>
+            <a:pPr lvl="4">
+              <a:defRPr b="0" sz="1800"/>
+            </a:pPr>
+            <a:r>
+              <a:rPr b="1" sz="2400"/>
+              <a:t>Body Level Five</a:t>
             </a:r>
           </a:p>
         </p:txBody>
@@ -1300,7 +1556,7 @@
             </a:pPr>
             <a:r>
               <a:rPr sz="4400"/>
-              <a:t>Click to edit Master title style</a:t>
+              <a:t>Title Text</a:t>
             </a:r>
           </a:p>
         </p:txBody>
@@ -1431,7 +1687,7 @@
             </a:pPr>
             <a:r>
               <a:rPr sz="3200"/>
-              <a:t>Click to edit Master title style</a:t>
+              <a:t>Title Text</a:t>
             </a:r>
           </a:p>
         </p:txBody>
@@ -1478,7 +1734,7 @@
             </a:pPr>
             <a:r>
               <a:rPr sz="3200"/>
-              <a:t>Click to edit Master text styles</a:t>
+              <a:t>Body Level One</a:t>
             </a:r>
             <a:endParaRPr sz="3200"/>
           </a:p>
@@ -1488,7 +1744,7 @@
             </a:pPr>
             <a:r>
               <a:rPr sz="3200"/>
-              <a:t>Second level</a:t>
+              <a:t>Body Level Two</a:t>
             </a:r>
             <a:endParaRPr sz="3200"/>
           </a:p>
@@ -1498,7 +1754,7 @@
             </a:pPr>
             <a:r>
               <a:rPr sz="3200"/>
-              <a:t>Third level</a:t>
+              <a:t>Body Level Three</a:t>
             </a:r>
             <a:endParaRPr sz="3200"/>
           </a:p>
@@ -1508,7 +1764,7 @@
             </a:pPr>
             <a:r>
               <a:rPr sz="3200"/>
-              <a:t>Fourth level</a:t>
+              <a:t>Body Level Four</a:t>
             </a:r>
             <a:endParaRPr sz="3200"/>
           </a:p>
@@ -1518,7 +1774,7 @@
             </a:pPr>
             <a:r>
               <a:rPr sz="3200"/>
-              <a:t>Fifth level</a:t>
+              <a:t>Body Level Five</a:t>
             </a:r>
           </a:p>
         </p:txBody>
@@ -1601,7 +1857,7 @@
             </a:pPr>
             <a:r>
               <a:rPr sz="3200"/>
-              <a:t>Click to edit Master title style</a:t>
+              <a:t>Title Text</a:t>
             </a:r>
           </a:p>
         </p:txBody>
@@ -1632,6 +1888,30 @@
               <a:buNone/>
               <a:defRPr sz="1600"/>
             </a:lvl1pPr>
+            <a:lvl2pPr marL="0" indent="457189">
+              <a:buSzTx/>
+              <a:buFontTx/>
+              <a:buNone/>
+              <a:defRPr sz="1600"/>
+            </a:lvl2pPr>
+            <a:lvl3pPr marL="0" indent="914377">
+              <a:buSzTx/>
+              <a:buFontTx/>
+              <a:buNone/>
+              <a:defRPr sz="1600"/>
+            </a:lvl3pPr>
+            <a:lvl4pPr marL="0" indent="1371565">
+              <a:buSzTx/>
+              <a:buFontTx/>
+              <a:buNone/>
+              <a:defRPr sz="1600"/>
+            </a:lvl4pPr>
+            <a:lvl5pPr marL="0" indent="1828754">
+              <a:buSzTx/>
+              <a:buFontTx/>
+              <a:buNone/>
+              <a:defRPr sz="1600"/>
+            </a:lvl5pPr>
           </a:lstStyle>
           <a:p>
             <a:pPr lvl="0">
@@ -1639,7 +1919,47 @@
             </a:pPr>
             <a:r>
               <a:rPr sz="1600"/>
-              <a:t>Click to edit Master text styles</a:t>
+              <a:t>Body Level One</a:t>
+            </a:r>
+            <a:endParaRPr sz="1600"/>
+          </a:p>
+          <a:p>
+            <a:pPr lvl="1">
+              <a:defRPr sz="1800"/>
+            </a:pPr>
+            <a:r>
+              <a:rPr sz="1600"/>
+              <a:t>Body Level Two</a:t>
+            </a:r>
+            <a:endParaRPr sz="1600"/>
+          </a:p>
+          <a:p>
+            <a:pPr lvl="2">
+              <a:defRPr sz="1800"/>
+            </a:pPr>
+            <a:r>
+              <a:rPr sz="1600"/>
+              <a:t>Body Level Three</a:t>
+            </a:r>
+            <a:endParaRPr sz="1600"/>
+          </a:p>
+          <a:p>
+            <a:pPr lvl="3">
+              <a:defRPr sz="1800"/>
+            </a:pPr>
+            <a:r>
+              <a:rPr sz="1600"/>
+              <a:t>Body Level Four</a:t>
+            </a:r>
+            <a:endParaRPr sz="1600"/>
+          </a:p>
+          <a:p>
+            <a:pPr lvl="4">
+              <a:defRPr sz="1800"/>
+            </a:pPr>
+            <a:r>
+              <a:rPr sz="1600"/>
+              <a:t>Body Level Five</a:t>
             </a:r>
           </a:p>
         </p:txBody>
@@ -1735,7 +2055,7 @@
             </a:pPr>
             <a:r>
               <a:rPr sz="4400"/>
-              <a:t>Click to edit Master title style</a:t>
+              <a:t>Title Text</a:t>
             </a:r>
           </a:p>
         </p:txBody>
@@ -1776,7 +2096,7 @@
             </a:pPr>
             <a:r>
               <a:rPr sz="2800"/>
-              <a:t>Click to edit Master text styles</a:t>
+              <a:t>Body Level One</a:t>
             </a:r>
             <a:endParaRPr sz="2800"/>
           </a:p>
@@ -1786,7 +2106,7 @@
             </a:pPr>
             <a:r>
               <a:rPr sz="2800"/>
-              <a:t>Second level</a:t>
+              <a:t>Body Level Two</a:t>
             </a:r>
             <a:endParaRPr sz="2800"/>
           </a:p>
@@ -1796,7 +2116,7 @@
             </a:pPr>
             <a:r>
               <a:rPr sz="2800"/>
-              <a:t>Third level</a:t>
+              <a:t>Body Level Three</a:t>
             </a:r>
             <a:endParaRPr sz="2800"/>
           </a:p>
@@ -1806,7 +2126,7 @@
             </a:pPr>
             <a:r>
               <a:rPr sz="2800"/>
-              <a:t>Fourth level</a:t>
+              <a:t>Body Level Four</a:t>
             </a:r>
             <a:endParaRPr sz="2800"/>
           </a:p>
@@ -1816,7 +2136,7 @@
             </a:pPr>
             <a:r>
               <a:rPr sz="2800"/>
-              <a:t>Fifth level</a:t>
+              <a:t>Body Level Five</a:t>
             </a:r>
           </a:p>
         </p:txBody>
@@ -2313,8 +2633,8 @@
         </p:nvSpPr>
         <p:spPr>
           <a:xfrm>
-            <a:off x="3048000" y="2393243"/>
-            <a:ext cx="9144000" cy="1655765"/>
+            <a:off x="3048000" y="2393244"/>
+            <a:ext cx="9144000" cy="1655764"/>
           </a:xfrm>
           <a:prstGeom prst="rect">
             <a:avLst/>
@@ -2727,7 +3047,7 @@
             </a:pPr>
             <a:r>
               <a:rPr sz="2744"/>
-              <a:t>By improving specialization, the cost of production (of services) can be driven down.  By increasing the number of customers, revenue can increase as as marginal costs decrease.</a:t>
+              <a:t>By improving specialization, the cost of production (of services) can be driven down.  By increasing the number of customers, revenue can increase as marginal costs decrease.</a:t>
             </a:r>
             <a:endParaRPr sz="2744"/>
           </a:p>
@@ -3507,8 +3827,8 @@
         </p:blipFill>
         <p:spPr>
           <a:xfrm>
-            <a:off x="838199" y="1733549"/>
-            <a:ext cx="10515601" cy="4835543"/>
+            <a:off x="838200" y="1733550"/>
+            <a:ext cx="10515600" cy="4835542"/>
           </a:xfrm>
           <a:prstGeom prst="rect">
             <a:avLst/>
@@ -4401,10 +4721,6 @@
           </p:nvPr>
         </p:nvSpPr>
         <p:spPr>
-          <a:xfrm>
-            <a:off x="8610600" y="6404294"/>
-            <a:ext cx="2743200" cy="269241"/>
-          </a:xfrm>
           <a:prstGeom prst="rect">
             <a:avLst/>
           </a:prstGeom>
@@ -4708,7 +5024,7 @@
         <p:spPr>
           <a:xfrm>
             <a:off x="838200" y="365127"/>
-            <a:ext cx="10515600" cy="1325564"/>
+            <a:ext cx="10515600" cy="1325563"/>
           </a:xfrm>
           <a:prstGeom prst="rect">
             <a:avLst/>
@@ -5162,10 +5478,6 @@
           </p:nvPr>
         </p:nvSpPr>
         <p:spPr>
-          <a:xfrm>
-            <a:off x="8610600" y="6404294"/>
-            <a:ext cx="2743200" cy="269241"/>
-          </a:xfrm>
           <a:prstGeom prst="rect">
             <a:avLst/>
           </a:prstGeom>
@@ -5213,8 +5525,8 @@
         </p:blipFill>
         <p:spPr>
           <a:xfrm>
-            <a:off x="1080752" y="1420037"/>
-            <a:ext cx="10030335" cy="4797925"/>
+            <a:off x="1080751" y="1420037"/>
+            <a:ext cx="10030336" cy="4797924"/>
           </a:xfrm>
           <a:prstGeom prst="rect">
             <a:avLst/>
@@ -5691,7 +6003,7 @@
         <p:spPr>
           <a:xfrm>
             <a:off x="742093" y="1572646"/>
-            <a:ext cx="10395695" cy="5163727"/>
+            <a:ext cx="10395695" cy="5163728"/>
           </a:xfrm>
           <a:prstGeom prst="rect">
             <a:avLst/>
@@ -5829,7 +6141,7 @@
             </a:pPr>
             <a:r>
               <a:rPr sz="2800"/>
-              <a:t>Enterprise Architecture has a slew of approaches, not one size fits all.</a:t>
+              <a:t>Enterprise Architecture has many approaches, not one size fits all.</a:t>
             </a:r>
             <a:endParaRPr sz="2800"/>
           </a:p>
@@ -6214,7 +6526,7 @@
         <p:spPr>
           <a:xfrm>
             <a:off x="5232765" y="1609322"/>
-            <a:ext cx="1859292" cy="2381350"/>
+            <a:ext cx="1859293" cy="2381350"/>
           </a:xfrm>
           <a:prstGeom prst="rect">
             <a:avLst/>
@@ -6268,8 +6580,8 @@
         </p:nvSpPr>
         <p:spPr>
           <a:xfrm>
-            <a:off x="9000746" y="6140410"/>
-            <a:ext cx="1449733" cy="370841"/>
+            <a:off x="9000745" y="6140410"/>
+            <a:ext cx="1449734" cy="370841"/>
           </a:xfrm>
           <a:prstGeom prst="rect">
             <a:avLst/>
@@ -6313,7 +6625,7 @@
         <p:spPr>
           <a:xfrm>
             <a:off x="7272590" y="1689421"/>
-            <a:ext cx="4906044" cy="4045545"/>
+            <a:ext cx="4906045" cy="4045545"/>
           </a:xfrm>
           <a:prstGeom prst="rect">
             <a:avLst/>
@@ -6841,7 +7153,7 @@
         <p:spPr>
           <a:xfrm>
             <a:off x="838200" y="365127"/>
-            <a:ext cx="10515600" cy="1325564"/>
+            <a:ext cx="10515600" cy="1325563"/>
           </a:xfrm>
           <a:prstGeom prst="rect">
             <a:avLst/>
@@ -6872,7 +7184,7 @@
         <p:spPr>
           <a:xfrm>
             <a:off x="838200" y="1785050"/>
-            <a:ext cx="10515600" cy="3714565"/>
+            <a:ext cx="10515600" cy="3714564"/>
           </a:xfrm>
           <a:prstGeom prst="rect">
             <a:avLst/>
@@ -7327,10 +7639,6 @@
           </p:nvPr>
         </p:nvSpPr>
         <p:spPr>
-          <a:xfrm>
-            <a:off x="8610600" y="6404294"/>
-            <a:ext cx="2743200" cy="269241"/>
-          </a:xfrm>
           <a:prstGeom prst="rect">
             <a:avLst/>
           </a:prstGeom>
@@ -7716,10 +8024,6 @@
           </p:nvPr>
         </p:nvSpPr>
         <p:spPr>
-          <a:xfrm>
-            <a:off x="8610600" y="6404294"/>
-            <a:ext cx="2743200" cy="269241"/>
-          </a:xfrm>
           <a:prstGeom prst="rect">
             <a:avLst/>
           </a:prstGeom>
@@ -7853,10 +8157,6 @@
           </p:nvPr>
         </p:nvSpPr>
         <p:spPr>
-          <a:xfrm>
-            <a:off x="8610600" y="6404294"/>
-            <a:ext cx="2743200" cy="269241"/>
-          </a:xfrm>
           <a:prstGeom prst="rect">
             <a:avLst/>
           </a:prstGeom>
@@ -8034,10 +8334,6 @@
           </p:nvPr>
         </p:nvSpPr>
         <p:spPr>
-          <a:xfrm>
-            <a:off x="8610600" y="6404294"/>
-            <a:ext cx="2743200" cy="269241"/>
-          </a:xfrm>
           <a:prstGeom prst="rect">
             <a:avLst/>
           </a:prstGeom>
@@ -8191,10 +8487,6 @@
           </p:nvPr>
         </p:nvSpPr>
         <p:spPr>
-          <a:xfrm>
-            <a:off x="8610600" y="6404294"/>
-            <a:ext cx="2743200" cy="269241"/>
-          </a:xfrm>
           <a:prstGeom prst="rect">
             <a:avLst/>
           </a:prstGeom>
@@ -8319,7 +8611,7 @@
             </a:pPr>
             <a:r>
               <a:rPr sz="2800"/>
-              <a:t>There is evidence that an organization is able to thrive in their market after adopting an SOA mandate They were able to develop marketable value-add functionality following their adoption of SOA. They accomplished this by imposing a requirement that everyone always use ’Services.’ Amazon used a series of Lego blocks to combine functionality in a wide variety of ways.</a:t>
+              <a:t>There is evidence that an organization is able to thrive in their market after adopting an SOA mandate. They were able to develop marketable value-add functionality following their adoption of SOA. They accomplished this by imposing a requirement that everyone always use ’Services.’ Amazon used a series of Lego blocks to combine functionality in a wide variety of ways.</a:t>
             </a:r>
           </a:p>
         </p:txBody>
@@ -8333,10 +8625,6 @@
           </p:nvPr>
         </p:nvSpPr>
         <p:spPr>
-          <a:xfrm>
-            <a:off x="8610600" y="6404294"/>
-            <a:ext cx="2743200" cy="269241"/>
-          </a:xfrm>
           <a:prstGeom prst="rect">
             <a:avLst/>
           </a:prstGeom>
@@ -8739,7 +9027,7 @@
         <p:spPr>
           <a:xfrm>
             <a:off x="838200" y="365127"/>
-            <a:ext cx="10515600" cy="1325564"/>
+            <a:ext cx="10515600" cy="1325563"/>
           </a:xfrm>
           <a:prstGeom prst="rect">
             <a:avLst/>
@@ -9592,10 +9880,6 @@
           </p:nvPr>
         </p:nvSpPr>
         <p:spPr>
-          <a:xfrm>
-            <a:off x="8610600" y="6404294"/>
-            <a:ext cx="2743200" cy="269241"/>
-          </a:xfrm>
           <a:prstGeom prst="rect">
             <a:avLst/>
           </a:prstGeom>
@@ -9919,7 +10203,7 @@
         </p:nvSpPr>
         <p:spPr>
           <a:xfrm>
-            <a:off x="9229692" y="5789266"/>
+            <a:off x="9229691" y="5789266"/>
             <a:ext cx="1505017" cy="458179"/>
           </a:xfrm>
           <a:prstGeom prst="rect">
@@ -10015,10 +10299,6 @@
           </p:nvPr>
         </p:nvSpPr>
         <p:spPr>
-          <a:xfrm>
-            <a:off x="8610600" y="6404294"/>
-            <a:ext cx="2743200" cy="269241"/>
-          </a:xfrm>
           <a:prstGeom prst="rect">
             <a:avLst/>
           </a:prstGeom>

</xml_diff>